<commit_message>
Added demo slides to ppt.
Signed-off-by: Natraj Kaushik <natraj.iitb@gmail.com>
</commit_message>
<xml_diff>
--- a/presentation/Emergency Response System.pptx
+++ b/presentation/Emergency Response System.pptx
@@ -6,6 +6,11 @@
   </p:sldMasterIdLst>
   <p:sldIdLst>
     <p:sldId id="256" r:id="rId2"/>
+    <p:sldId id="257" r:id="rId3"/>
+    <p:sldId id="258" r:id="rId4"/>
+    <p:sldId id="259" r:id="rId5"/>
+    <p:sldId id="260" r:id="rId6"/>
+    <p:sldId id="261" r:id="rId7"/>
   </p:sldIdLst>
   <p:sldSz cx="9144000" cy="6858000" type="screen4x3"/>
   <p:notesSz cx="6858000" cy="9144000"/>
@@ -3437,6 +3442,566 @@
 </p:sld>
 </file>
 
+<file path=ppt/slides/slide2.xml><?xml version="1.0" encoding="utf-8"?>
+<p:sld xmlns:a="http://schemas.openxmlformats.org/drawingml/2006/main" xmlns:r="http://schemas.openxmlformats.org/officeDocument/2006/relationships" xmlns:p="http://schemas.openxmlformats.org/presentationml/2006/main">
+  <p:cSld>
+    <p:spTree>
+      <p:nvGrpSpPr>
+        <p:cNvPr id="1" name=""/>
+        <p:cNvGrpSpPr/>
+        <p:nvPr/>
+      </p:nvGrpSpPr>
+      <p:grpSpPr>
+        <a:xfrm>
+          <a:off x="0" y="0"/>
+          <a:ext cx="0" cy="0"/>
+          <a:chOff x="0" y="0"/>
+          <a:chExt cx="0" cy="0"/>
+        </a:xfrm>
+      </p:grpSpPr>
+      <p:sp>
+        <p:nvSpPr>
+          <p:cNvPr id="2" name="Title 1"/>
+          <p:cNvSpPr>
+            <a:spLocks noGrp="1"/>
+          </p:cNvSpPr>
+          <p:nvPr>
+            <p:ph type="ctrTitle"/>
+          </p:nvPr>
+        </p:nvSpPr>
+        <p:spPr>
+          <a:xfrm>
+            <a:off x="685800" y="609601"/>
+            <a:ext cx="7543800" cy="990599"/>
+          </a:xfrm>
+        </p:spPr>
+        <p:txBody>
+          <a:bodyPr/>
+          <a:lstStyle/>
+          <a:p>
+            <a:r>
+              <a:rPr lang="en-US" sz="4000" dirty="0" smtClean="0"/>
+              <a:t>Emergency Response System - Demo</a:t>
+            </a:r>
+            <a:endParaRPr lang="en-US" sz="4000" dirty="0"/>
+          </a:p>
+        </p:txBody>
+      </p:sp>
+      <p:sp>
+        <p:nvSpPr>
+          <p:cNvPr id="3" name="Subtitle 2"/>
+          <p:cNvSpPr>
+            <a:spLocks noGrp="1"/>
+          </p:cNvSpPr>
+          <p:nvPr>
+            <p:ph type="subTitle" idx="1"/>
+          </p:nvPr>
+        </p:nvSpPr>
+        <p:spPr>
+          <a:xfrm>
+            <a:off x="1219200" y="1981200"/>
+            <a:ext cx="6705600" cy="4191000"/>
+          </a:xfrm>
+        </p:spPr>
+        <p:txBody>
+          <a:bodyPr/>
+          <a:lstStyle/>
+          <a:p>
+            <a:pPr algn="l"/>
+            <a:r>
+              <a:rPr lang="en-US" dirty="0" smtClean="0"/>
+              <a:t>The demo system consists of four components</a:t>
+            </a:r>
+          </a:p>
+          <a:p>
+            <a:pPr algn="l"/>
+            <a:endParaRPr lang="en-US" dirty="0" smtClean="0"/>
+          </a:p>
+          <a:p>
+            <a:pPr marL="342900" indent="-342900" algn="l">
+              <a:buFont typeface="Arial" panose="020B0604020202020204" pitchFamily="34" charset="0"/>
+              <a:buChar char="•"/>
+            </a:pPr>
+            <a:r>
+              <a:rPr lang="en-US" dirty="0" err="1" smtClean="0"/>
+              <a:t>Arduino</a:t>
+            </a:r>
+            <a:r>
+              <a:rPr lang="en-US" dirty="0" smtClean="0"/>
+              <a:t> based emergency button</a:t>
+            </a:r>
+          </a:p>
+          <a:p>
+            <a:pPr marL="342900" indent="-342900" algn="l">
+              <a:buFont typeface="Arial" panose="020B0604020202020204" pitchFamily="34" charset="0"/>
+              <a:buChar char="•"/>
+            </a:pPr>
+            <a:r>
+              <a:rPr lang="en-US" dirty="0" smtClean="0"/>
+              <a:t>Mobile Service paired with button</a:t>
+            </a:r>
+          </a:p>
+          <a:p>
+            <a:pPr marL="342900" indent="-342900" algn="l">
+              <a:buFont typeface="Arial" panose="020B0604020202020204" pitchFamily="34" charset="0"/>
+              <a:buChar char="•"/>
+            </a:pPr>
+            <a:r>
+              <a:rPr lang="en-US" dirty="0" smtClean="0"/>
+              <a:t>SMS processing emergency response engine</a:t>
+            </a:r>
+          </a:p>
+          <a:p>
+            <a:pPr marL="342900" indent="-342900" algn="l">
+              <a:buFont typeface="Arial" panose="020B0604020202020204" pitchFamily="34" charset="0"/>
+              <a:buChar char="•"/>
+            </a:pPr>
+            <a:r>
+              <a:rPr lang="en-US" dirty="0" smtClean="0"/>
+              <a:t>Web interface to track the person in emergency. </a:t>
+            </a:r>
+            <a:endParaRPr lang="en-US" dirty="0"/>
+          </a:p>
+        </p:txBody>
+      </p:sp>
+    </p:spTree>
+    <p:extLst>
+      <p:ext uri="{BB962C8B-B14F-4D97-AF65-F5344CB8AC3E}">
+        <p14:creationId xmlns:p14="http://schemas.microsoft.com/office/powerpoint/2010/main" val="3040117031"/>
+      </p:ext>
+    </p:extLst>
+  </p:cSld>
+  <p:clrMapOvr>
+    <a:masterClrMapping/>
+  </p:clrMapOvr>
+</p:sld>
+</file>
+
+<file path=ppt/slides/slide3.xml><?xml version="1.0" encoding="utf-8"?>
+<p:sld xmlns:a="http://schemas.openxmlformats.org/drawingml/2006/main" xmlns:r="http://schemas.openxmlformats.org/officeDocument/2006/relationships" xmlns:p="http://schemas.openxmlformats.org/presentationml/2006/main">
+  <p:cSld>
+    <p:spTree>
+      <p:nvGrpSpPr>
+        <p:cNvPr id="1" name=""/>
+        <p:cNvGrpSpPr/>
+        <p:nvPr/>
+      </p:nvGrpSpPr>
+      <p:grpSpPr>
+        <a:xfrm>
+          <a:off x="0" y="0"/>
+          <a:ext cx="0" cy="0"/>
+          <a:chOff x="0" y="0"/>
+          <a:chExt cx="0" cy="0"/>
+        </a:xfrm>
+      </p:grpSpPr>
+      <p:sp>
+        <p:nvSpPr>
+          <p:cNvPr id="2" name="Title 1"/>
+          <p:cNvSpPr>
+            <a:spLocks noGrp="1"/>
+          </p:cNvSpPr>
+          <p:nvPr>
+            <p:ph type="ctrTitle"/>
+          </p:nvPr>
+        </p:nvSpPr>
+        <p:spPr>
+          <a:xfrm>
+            <a:off x="685800" y="609601"/>
+            <a:ext cx="7543800" cy="990599"/>
+          </a:xfrm>
+        </p:spPr>
+        <p:txBody>
+          <a:bodyPr/>
+          <a:lstStyle/>
+          <a:p>
+            <a:r>
+              <a:rPr lang="en-US" sz="4000" dirty="0" smtClean="0"/>
+              <a:t>Emergency Response System - Demo</a:t>
+            </a:r>
+            <a:endParaRPr lang="en-US" sz="4000" dirty="0"/>
+          </a:p>
+        </p:txBody>
+      </p:sp>
+      <p:sp>
+        <p:nvSpPr>
+          <p:cNvPr id="3" name="Subtitle 2"/>
+          <p:cNvSpPr>
+            <a:spLocks noGrp="1"/>
+          </p:cNvSpPr>
+          <p:nvPr>
+            <p:ph type="subTitle" idx="1"/>
+          </p:nvPr>
+        </p:nvSpPr>
+        <p:spPr>
+          <a:xfrm>
+            <a:off x="1219200" y="1981200"/>
+            <a:ext cx="6705600" cy="4191000"/>
+          </a:xfrm>
+        </p:spPr>
+        <p:txBody>
+          <a:bodyPr/>
+          <a:lstStyle/>
+          <a:p>
+            <a:pPr algn="l"/>
+            <a:r>
+              <a:rPr lang="en-US" dirty="0" smtClean="0"/>
+              <a:t>Emergency Button</a:t>
+            </a:r>
+          </a:p>
+          <a:p>
+            <a:pPr algn="l"/>
+            <a:endParaRPr lang="en-US" dirty="0"/>
+          </a:p>
+          <a:p>
+            <a:pPr algn="l"/>
+            <a:endParaRPr lang="en-US" dirty="0" smtClean="0"/>
+          </a:p>
+          <a:p>
+            <a:pPr algn="l"/>
+            <a:r>
+              <a:rPr lang="en-US" dirty="0" smtClean="0"/>
+              <a:t>[Insert Image of Button]</a:t>
+            </a:r>
+          </a:p>
+          <a:p>
+            <a:pPr algn="l"/>
+            <a:endParaRPr lang="en-US" dirty="0" smtClean="0"/>
+          </a:p>
+        </p:txBody>
+      </p:sp>
+    </p:spTree>
+    <p:extLst>
+      <p:ext uri="{BB962C8B-B14F-4D97-AF65-F5344CB8AC3E}">
+        <p14:creationId xmlns:p14="http://schemas.microsoft.com/office/powerpoint/2010/main" val="3172679140"/>
+      </p:ext>
+    </p:extLst>
+  </p:cSld>
+  <p:clrMapOvr>
+    <a:masterClrMapping/>
+  </p:clrMapOvr>
+</p:sld>
+</file>
+
+<file path=ppt/slides/slide4.xml><?xml version="1.0" encoding="utf-8"?>
+<p:sld xmlns:a="http://schemas.openxmlformats.org/drawingml/2006/main" xmlns:r="http://schemas.openxmlformats.org/officeDocument/2006/relationships" xmlns:p="http://schemas.openxmlformats.org/presentationml/2006/main">
+  <p:cSld>
+    <p:spTree>
+      <p:nvGrpSpPr>
+        <p:cNvPr id="1" name=""/>
+        <p:cNvGrpSpPr/>
+        <p:nvPr/>
+      </p:nvGrpSpPr>
+      <p:grpSpPr>
+        <a:xfrm>
+          <a:off x="0" y="0"/>
+          <a:ext cx="0" cy="0"/>
+          <a:chOff x="0" y="0"/>
+          <a:chExt cx="0" cy="0"/>
+        </a:xfrm>
+      </p:grpSpPr>
+      <p:sp>
+        <p:nvSpPr>
+          <p:cNvPr id="2" name="Title 1"/>
+          <p:cNvSpPr>
+            <a:spLocks noGrp="1"/>
+          </p:cNvSpPr>
+          <p:nvPr>
+            <p:ph type="ctrTitle"/>
+          </p:nvPr>
+        </p:nvSpPr>
+        <p:spPr>
+          <a:xfrm>
+            <a:off x="685800" y="609601"/>
+            <a:ext cx="7543800" cy="990599"/>
+          </a:xfrm>
+        </p:spPr>
+        <p:txBody>
+          <a:bodyPr/>
+          <a:lstStyle/>
+          <a:p>
+            <a:r>
+              <a:rPr lang="en-US" sz="4000" dirty="0" smtClean="0"/>
+              <a:t>Emergency Response System - Demo</a:t>
+            </a:r>
+            <a:endParaRPr lang="en-US" sz="4000" dirty="0"/>
+          </a:p>
+        </p:txBody>
+      </p:sp>
+      <p:sp>
+        <p:nvSpPr>
+          <p:cNvPr id="3" name="Subtitle 2"/>
+          <p:cNvSpPr>
+            <a:spLocks noGrp="1"/>
+          </p:cNvSpPr>
+          <p:nvPr>
+            <p:ph type="subTitle" idx="1"/>
+          </p:nvPr>
+        </p:nvSpPr>
+        <p:spPr>
+          <a:xfrm>
+            <a:off x="1219200" y="1981200"/>
+            <a:ext cx="6705600" cy="4191000"/>
+          </a:xfrm>
+        </p:spPr>
+        <p:txBody>
+          <a:bodyPr/>
+          <a:lstStyle/>
+          <a:p>
+            <a:pPr algn="l"/>
+            <a:r>
+              <a:rPr lang="en-US" dirty="0" smtClean="0"/>
+              <a:t>Mobile Service</a:t>
+            </a:r>
+          </a:p>
+          <a:p>
+            <a:pPr algn="l"/>
+            <a:endParaRPr lang="en-US" dirty="0"/>
+          </a:p>
+          <a:p>
+            <a:pPr algn="l"/>
+            <a:endParaRPr lang="en-US" dirty="0" smtClean="0"/>
+          </a:p>
+          <a:p>
+            <a:pPr algn="l"/>
+            <a:r>
+              <a:rPr lang="en-US" dirty="0" smtClean="0"/>
+              <a:t>[Insert Image of Mobile Service]</a:t>
+            </a:r>
+          </a:p>
+          <a:p>
+            <a:pPr algn="l"/>
+            <a:endParaRPr lang="en-US" dirty="0" smtClean="0"/>
+          </a:p>
+        </p:txBody>
+      </p:sp>
+    </p:spTree>
+    <p:extLst>
+      <p:ext uri="{BB962C8B-B14F-4D97-AF65-F5344CB8AC3E}">
+        <p14:creationId xmlns:p14="http://schemas.microsoft.com/office/powerpoint/2010/main" val="4242563799"/>
+      </p:ext>
+    </p:extLst>
+  </p:cSld>
+  <p:clrMapOvr>
+    <a:masterClrMapping/>
+  </p:clrMapOvr>
+</p:sld>
+</file>
+
+<file path=ppt/slides/slide5.xml><?xml version="1.0" encoding="utf-8"?>
+<p:sld xmlns:a="http://schemas.openxmlformats.org/drawingml/2006/main" xmlns:r="http://schemas.openxmlformats.org/officeDocument/2006/relationships" xmlns:p="http://schemas.openxmlformats.org/presentationml/2006/main">
+  <p:cSld>
+    <p:spTree>
+      <p:nvGrpSpPr>
+        <p:cNvPr id="1" name=""/>
+        <p:cNvGrpSpPr/>
+        <p:nvPr/>
+      </p:nvGrpSpPr>
+      <p:grpSpPr>
+        <a:xfrm>
+          <a:off x="0" y="0"/>
+          <a:ext cx="0" cy="0"/>
+          <a:chOff x="0" y="0"/>
+          <a:chExt cx="0" cy="0"/>
+        </a:xfrm>
+      </p:grpSpPr>
+      <p:sp>
+        <p:nvSpPr>
+          <p:cNvPr id="2" name="Title 1"/>
+          <p:cNvSpPr>
+            <a:spLocks noGrp="1"/>
+          </p:cNvSpPr>
+          <p:nvPr>
+            <p:ph type="ctrTitle"/>
+          </p:nvPr>
+        </p:nvSpPr>
+        <p:spPr>
+          <a:xfrm>
+            <a:off x="685800" y="609601"/>
+            <a:ext cx="7543800" cy="990599"/>
+          </a:xfrm>
+        </p:spPr>
+        <p:txBody>
+          <a:bodyPr/>
+          <a:lstStyle/>
+          <a:p>
+            <a:r>
+              <a:rPr lang="en-US" sz="4000" dirty="0" smtClean="0"/>
+              <a:t>Emergency Response System - Demo</a:t>
+            </a:r>
+            <a:endParaRPr lang="en-US" sz="4000" dirty="0"/>
+          </a:p>
+        </p:txBody>
+      </p:sp>
+      <p:sp>
+        <p:nvSpPr>
+          <p:cNvPr id="3" name="Subtitle 2"/>
+          <p:cNvSpPr>
+            <a:spLocks noGrp="1"/>
+          </p:cNvSpPr>
+          <p:nvPr>
+            <p:ph type="subTitle" idx="1"/>
+          </p:nvPr>
+        </p:nvSpPr>
+        <p:spPr>
+          <a:xfrm>
+            <a:off x="1219200" y="1981200"/>
+            <a:ext cx="6705600" cy="4191000"/>
+          </a:xfrm>
+        </p:spPr>
+        <p:txBody>
+          <a:bodyPr/>
+          <a:lstStyle/>
+          <a:p>
+            <a:pPr algn="l"/>
+            <a:r>
+              <a:rPr lang="en-US" dirty="0" smtClean="0"/>
+              <a:t>SMS Processing Engine</a:t>
+            </a:r>
+          </a:p>
+          <a:p>
+            <a:pPr algn="l"/>
+            <a:endParaRPr lang="en-US" dirty="0"/>
+          </a:p>
+          <a:p>
+            <a:pPr algn="l"/>
+            <a:endParaRPr lang="en-US" dirty="0" smtClean="0"/>
+          </a:p>
+          <a:p>
+            <a:pPr algn="l"/>
+            <a:r>
+              <a:rPr lang="en-US" dirty="0" smtClean="0"/>
+              <a:t>[Insert Image of SMS Engine]</a:t>
+            </a:r>
+          </a:p>
+          <a:p>
+            <a:pPr algn="l"/>
+            <a:endParaRPr lang="en-US" dirty="0" smtClean="0"/>
+          </a:p>
+        </p:txBody>
+      </p:sp>
+    </p:spTree>
+    <p:extLst>
+      <p:ext uri="{BB962C8B-B14F-4D97-AF65-F5344CB8AC3E}">
+        <p14:creationId xmlns:p14="http://schemas.microsoft.com/office/powerpoint/2010/main" val="4242563799"/>
+      </p:ext>
+    </p:extLst>
+  </p:cSld>
+  <p:clrMapOvr>
+    <a:masterClrMapping/>
+  </p:clrMapOvr>
+</p:sld>
+</file>
+
+<file path=ppt/slides/slide6.xml><?xml version="1.0" encoding="utf-8"?>
+<p:sld xmlns:a="http://schemas.openxmlformats.org/drawingml/2006/main" xmlns:r="http://schemas.openxmlformats.org/officeDocument/2006/relationships" xmlns:p="http://schemas.openxmlformats.org/presentationml/2006/main">
+  <p:cSld>
+    <p:spTree>
+      <p:nvGrpSpPr>
+        <p:cNvPr id="1" name=""/>
+        <p:cNvGrpSpPr/>
+        <p:nvPr/>
+      </p:nvGrpSpPr>
+      <p:grpSpPr>
+        <a:xfrm>
+          <a:off x="0" y="0"/>
+          <a:ext cx="0" cy="0"/>
+          <a:chOff x="0" y="0"/>
+          <a:chExt cx="0" cy="0"/>
+        </a:xfrm>
+      </p:grpSpPr>
+      <p:sp>
+        <p:nvSpPr>
+          <p:cNvPr id="2" name="Title 1"/>
+          <p:cNvSpPr>
+            <a:spLocks noGrp="1"/>
+          </p:cNvSpPr>
+          <p:nvPr>
+            <p:ph type="ctrTitle"/>
+          </p:nvPr>
+        </p:nvSpPr>
+        <p:spPr>
+          <a:xfrm>
+            <a:off x="685800" y="609601"/>
+            <a:ext cx="7543800" cy="990599"/>
+          </a:xfrm>
+        </p:spPr>
+        <p:txBody>
+          <a:bodyPr/>
+          <a:lstStyle/>
+          <a:p>
+            <a:r>
+              <a:rPr lang="en-US" sz="4000" dirty="0" smtClean="0"/>
+              <a:t>Emergency Response System - Demo</a:t>
+            </a:r>
+            <a:endParaRPr lang="en-US" sz="4000" dirty="0"/>
+          </a:p>
+        </p:txBody>
+      </p:sp>
+      <p:sp>
+        <p:nvSpPr>
+          <p:cNvPr id="3" name="Subtitle 2"/>
+          <p:cNvSpPr>
+            <a:spLocks noGrp="1"/>
+          </p:cNvSpPr>
+          <p:nvPr>
+            <p:ph type="subTitle" idx="1"/>
+          </p:nvPr>
+        </p:nvSpPr>
+        <p:spPr>
+          <a:xfrm>
+            <a:off x="1219200" y="1981200"/>
+            <a:ext cx="6705600" cy="4191000"/>
+          </a:xfrm>
+        </p:spPr>
+        <p:txBody>
+          <a:bodyPr/>
+          <a:lstStyle/>
+          <a:p>
+            <a:pPr algn="l"/>
+            <a:r>
+              <a:rPr lang="en-US" dirty="0" smtClean="0"/>
+              <a:t>User Interface</a:t>
+            </a:r>
+          </a:p>
+          <a:p>
+            <a:pPr algn="l"/>
+            <a:endParaRPr lang="en-US" dirty="0"/>
+          </a:p>
+          <a:p>
+            <a:pPr algn="l"/>
+            <a:endParaRPr lang="en-US" dirty="0" smtClean="0"/>
+          </a:p>
+          <a:p>
+            <a:pPr algn="l"/>
+            <a:r>
+              <a:rPr lang="en-US" dirty="0" smtClean="0"/>
+              <a:t>[Insert Image </a:t>
+            </a:r>
+            <a:r>
+              <a:rPr lang="en-US" smtClean="0"/>
+              <a:t>of UI]</a:t>
+            </a:r>
+            <a:endParaRPr lang="en-US" dirty="0" smtClean="0"/>
+          </a:p>
+          <a:p>
+            <a:pPr algn="l"/>
+            <a:endParaRPr lang="en-US" dirty="0" smtClean="0"/>
+          </a:p>
+        </p:txBody>
+      </p:sp>
+    </p:spTree>
+    <p:extLst>
+      <p:ext uri="{BB962C8B-B14F-4D97-AF65-F5344CB8AC3E}">
+        <p14:creationId xmlns:p14="http://schemas.microsoft.com/office/powerpoint/2010/main" val="4242563799"/>
+      </p:ext>
+    </p:extLst>
+  </p:cSld>
+  <p:clrMapOvr>
+    <a:masterClrMapping/>
+  </p:clrMapOvr>
+</p:sld>
+</file>
+
 <file path=ppt/theme/theme1.xml><?xml version="1.0" encoding="utf-8"?>
 <a:theme xmlns:a="http://schemas.openxmlformats.org/drawingml/2006/main" name="Executive">
   <a:themeElements>

</xml_diff>